<commit_message>
Update 1 & 7
</commit_message>
<xml_diff>
--- a/1榮耀無限.pptx
+++ b/1榮耀無限.pptx
@@ -5,11 +5,12 @@
     <p:sldMasterId id="2147483764" r:id="rId1"/>
   </p:sldMasterIdLst>
   <p:sldIdLst>
-    <p:sldId id="265" r:id="rId2"/>
-    <p:sldId id="266" r:id="rId3"/>
-    <p:sldId id="267" r:id="rId4"/>
-    <p:sldId id="268" r:id="rId5"/>
-    <p:sldId id="269" r:id="rId6"/>
+    <p:sldId id="256" r:id="rId2"/>
+    <p:sldId id="257" r:id="rId3"/>
+    <p:sldId id="258" r:id="rId4"/>
+    <p:sldId id="259" r:id="rId5"/>
+    <p:sldId id="260" r:id="rId6"/>
+    <p:sldId id="261" r:id="rId7"/>
   </p:sldIdLst>
   <p:sldSz cx="12192000" cy="6858000"/>
   <p:notesSz cx="6858000" cy="9144000"/>
@@ -344,7 +345,7 @@
               <a:pPr>
                 <a:defRPr/>
               </a:pPr>
-              <a:t>10/24/2020</a:t>
+              <a:t>12/11/2021</a:t>
             </a:fld>
             <a:endParaRPr lang="en-US" altLang="zh-TW"/>
           </a:p>
@@ -524,7 +525,7 @@
               <a:pPr>
                 <a:defRPr/>
               </a:pPr>
-              <a:t>10/24/2020</a:t>
+              <a:t>12/11/2021</a:t>
             </a:fld>
             <a:endParaRPr lang="en-US" altLang="zh-TW"/>
           </a:p>
@@ -714,7 +715,7 @@
               <a:pPr>
                 <a:defRPr/>
               </a:pPr>
-              <a:t>10/24/2020</a:t>
+              <a:t>12/11/2021</a:t>
             </a:fld>
             <a:endParaRPr lang="en-US" altLang="zh-TW"/>
           </a:p>
@@ -894,7 +895,7 @@
               <a:pPr>
                 <a:defRPr/>
               </a:pPr>
-              <a:t>10/24/2020</a:t>
+              <a:t>12/11/2021</a:t>
             </a:fld>
             <a:endParaRPr lang="en-US" altLang="zh-TW"/>
           </a:p>
@@ -1150,7 +1151,7 @@
               <a:pPr>
                 <a:defRPr/>
               </a:pPr>
-              <a:t>10/24/2020</a:t>
+              <a:t>12/11/2021</a:t>
             </a:fld>
             <a:endParaRPr lang="en-US" altLang="zh-TW"/>
           </a:p>
@@ -1448,7 +1449,7 @@
               <a:pPr>
                 <a:defRPr/>
               </a:pPr>
-              <a:t>10/24/2020</a:t>
+              <a:t>12/11/2021</a:t>
             </a:fld>
             <a:endParaRPr lang="en-US" altLang="zh-TW"/>
           </a:p>
@@ -1880,7 +1881,7 @@
               <a:pPr>
                 <a:defRPr/>
               </a:pPr>
-              <a:t>10/24/2020</a:t>
+              <a:t>12/11/2021</a:t>
             </a:fld>
             <a:endParaRPr lang="en-US" altLang="zh-TW"/>
           </a:p>
@@ -2008,7 +2009,7 @@
               <a:pPr>
                 <a:defRPr/>
               </a:pPr>
-              <a:t>10/24/2020</a:t>
+              <a:t>12/11/2021</a:t>
             </a:fld>
             <a:endParaRPr lang="en-US" altLang="zh-TW"/>
           </a:p>
@@ -2113,7 +2114,7 @@
               <a:pPr>
                 <a:defRPr/>
               </a:pPr>
-              <a:t>10/24/2020</a:t>
+              <a:t>12/11/2021</a:t>
             </a:fld>
             <a:endParaRPr lang="en-US" altLang="zh-TW"/>
           </a:p>
@@ -2400,7 +2401,7 @@
               <a:pPr>
                 <a:defRPr/>
               </a:pPr>
-              <a:t>10/24/2020</a:t>
+              <a:t>12/11/2021</a:t>
             </a:fld>
             <a:endParaRPr lang="en-US" altLang="zh-TW"/>
           </a:p>
@@ -2667,7 +2668,7 @@
               <a:pPr>
                 <a:defRPr/>
               </a:pPr>
-              <a:t>10/24/2020</a:t>
+              <a:t>12/11/2021</a:t>
             </a:fld>
             <a:endParaRPr lang="en-US" altLang="zh-TW"/>
           </a:p>
@@ -2895,7 +2896,7 @@
               <a:pPr>
                 <a:defRPr/>
               </a:pPr>
-              <a:t>10/24/2020</a:t>
+              <a:t>12/11/2021</a:t>
             </a:fld>
             <a:endParaRPr lang="en-US" altLang="zh-TW"/>
           </a:p>
@@ -3358,7 +3359,7 @@
               <a:t>詩</a:t>
             </a:r>
             <a:r>
-              <a:rPr lang="zh-CN" altLang="en-US" sz="4000" b="1" dirty="0" smtClean="0">
+              <a:rPr lang="zh-CN" altLang="en-US" sz="4000" b="1" dirty="0">
                 <a:solidFill>
                   <a:srgbClr val="000066"/>
                 </a:solidFill>
@@ -3368,7 +3369,7 @@
               <a:t> </a:t>
             </a:r>
             <a:r>
-              <a:rPr lang="en-US" altLang="zh-CN" sz="4000" b="1" dirty="0" smtClean="0">
+              <a:rPr lang="en-US" altLang="zh-CN" sz="4000" b="1" dirty="0">
                 <a:solidFill>
                   <a:srgbClr val="000066"/>
                 </a:solidFill>
@@ -3378,7 +3379,7 @@
               <a:t>19</a:t>
             </a:r>
             <a:r>
-              <a:rPr lang="zh-CN" altLang="en-US" sz="4000" b="1" dirty="0" smtClean="0">
+              <a:rPr lang="zh-CN" altLang="en-US" sz="4000" b="1" dirty="0">
                 <a:solidFill>
                   <a:srgbClr val="000066"/>
                 </a:solidFill>
@@ -3388,7 +3389,7 @@
               <a:t>：</a:t>
             </a:r>
             <a:r>
-              <a:rPr lang="en-US" altLang="zh-CN" sz="4000" b="1" dirty="0" smtClean="0">
+              <a:rPr lang="en-US" altLang="zh-CN" sz="4000" b="1" dirty="0">
                 <a:solidFill>
                   <a:srgbClr val="000066"/>
                 </a:solidFill>
@@ -3398,7 +3399,7 @@
               <a:t>1 – </a:t>
             </a:r>
             <a:r>
-              <a:rPr lang="en-US" altLang="zh-CN" sz="4000" b="1" smtClean="0">
+              <a:rPr lang="en-US" altLang="zh-CN" sz="4000" b="1">
                 <a:solidFill>
                   <a:srgbClr val="000066"/>
                 </a:solidFill>
@@ -3408,7 +3409,7 @@
               <a:t>4  ;  96 </a:t>
             </a:r>
             <a:r>
-              <a:rPr lang="en-US" altLang="zh-CN" sz="4000" b="1" dirty="0" smtClean="0">
+              <a:rPr lang="en-US" altLang="zh-CN" sz="4000" b="1" dirty="0">
                 <a:solidFill>
                   <a:srgbClr val="000066"/>
                 </a:solidFill>
@@ -3418,7 +3419,7 @@
               <a:t>: 6</a:t>
             </a:r>
             <a:r>
-              <a:rPr lang="zh-CN" altLang="en-US" sz="4000" b="1" dirty="0" smtClean="0">
+              <a:rPr lang="zh-CN" altLang="en-US" sz="4000" b="1" dirty="0">
                 <a:solidFill>
                   <a:srgbClr val="000066"/>
                 </a:solidFill>
@@ -3428,7 +3429,7 @@
               <a:t>，</a:t>
             </a:r>
             <a:r>
-              <a:rPr lang="en-US" altLang="zh-CN" sz="4000" b="1" dirty="0" smtClean="0">
+              <a:rPr lang="en-US" altLang="zh-CN" sz="4000" b="1" dirty="0">
                 <a:solidFill>
                   <a:srgbClr val="000066"/>
                 </a:solidFill>
@@ -3438,7 +3439,7 @@
               <a:t>8</a:t>
             </a:r>
             <a:r>
-              <a:rPr lang="zh-CN" altLang="en-US" sz="4000" b="1" dirty="0" smtClean="0">
+              <a:rPr lang="zh-CN" altLang="en-US" sz="4000" b="1" dirty="0">
                 <a:solidFill>
                   <a:srgbClr val="000066"/>
                 </a:solidFill>
@@ -3448,7 +3449,7 @@
               <a:t>，</a:t>
             </a:r>
             <a:r>
-              <a:rPr lang="en-US" altLang="zh-CN" sz="4000" b="1" dirty="0" smtClean="0">
+              <a:rPr lang="en-US" altLang="zh-CN" sz="4000" b="1" dirty="0">
                 <a:solidFill>
                   <a:srgbClr val="000066"/>
                 </a:solidFill>
@@ -3458,7 +3459,7 @@
               <a:t>3</a:t>
             </a:r>
             <a:r>
-              <a:rPr lang="zh-CN" altLang="en-US" sz="4000" b="1" dirty="0" smtClean="0">
+              <a:rPr lang="zh-CN" altLang="en-US" sz="4000" b="1" dirty="0">
                 <a:solidFill>
                   <a:srgbClr val="000066"/>
                 </a:solidFill>
@@ -3468,7 +3469,7 @@
               <a:t>，</a:t>
             </a:r>
             <a:r>
-              <a:rPr lang="en-US" altLang="zh-CN" sz="4000" b="1" dirty="0" smtClean="0">
+              <a:rPr lang="en-US" altLang="zh-CN" sz="4000" b="1" dirty="0">
                 <a:solidFill>
                   <a:srgbClr val="000066"/>
                 </a:solidFill>
@@ -3478,7 +3479,7 @@
               <a:t>7</a:t>
             </a:r>
             <a:r>
-              <a:rPr lang="zh-CN" altLang="en-US" sz="4000" b="1" dirty="0" smtClean="0">
+              <a:rPr lang="zh-CN" altLang="en-US" sz="4000" b="1" dirty="0">
                 <a:solidFill>
                   <a:srgbClr val="000066"/>
                 </a:solidFill>
@@ -3488,7 +3489,7 @@
               <a:t>，</a:t>
             </a:r>
             <a:r>
-              <a:rPr lang="en-US" altLang="zh-CN" sz="4000" b="1" dirty="0" smtClean="0">
+              <a:rPr lang="en-US" altLang="zh-CN" sz="4000" b="1" dirty="0">
                 <a:solidFill>
                   <a:srgbClr val="000066"/>
                 </a:solidFill>
@@ -3498,7 +3499,7 @@
               <a:t>4</a:t>
             </a:r>
             <a:r>
-              <a:rPr lang="zh-CN" altLang="en-US" sz="4000" b="1" dirty="0" smtClean="0">
+              <a:rPr lang="zh-CN" altLang="en-US" sz="4000" b="1" dirty="0">
                 <a:solidFill>
                   <a:srgbClr val="000066"/>
                 </a:solidFill>
@@ -3508,7 +3509,7 @@
               <a:t>，</a:t>
             </a:r>
             <a:r>
-              <a:rPr lang="en-US" altLang="zh-CN" sz="4000" b="1" dirty="0" smtClean="0">
+              <a:rPr lang="en-US" altLang="zh-CN" sz="4000" b="1" dirty="0">
                 <a:solidFill>
                   <a:srgbClr val="000066"/>
                 </a:solidFill>
@@ -3530,7 +3531,7 @@
     </p:spTree>
     <p:extLst>
       <p:ext uri="{BB962C8B-B14F-4D97-AF65-F5344CB8AC3E}">
-        <p14:creationId xmlns:p14="http://schemas.microsoft.com/office/powerpoint/2010/main" val="1870649147"/>
+        <p14:creationId xmlns:p14="http://schemas.microsoft.com/office/powerpoint/2010/main" val="713674265"/>
       </p:ext>
     </p:extLst>
   </p:cSld>
@@ -3650,7 +3651,7 @@
     </p:spTree>
     <p:extLst>
       <p:ext uri="{BB962C8B-B14F-4D97-AF65-F5344CB8AC3E}">
-        <p14:creationId xmlns:p14="http://schemas.microsoft.com/office/powerpoint/2010/main" val="507164953"/>
+        <p14:creationId xmlns:p14="http://schemas.microsoft.com/office/powerpoint/2010/main" val="3859680441"/>
       </p:ext>
     </p:extLst>
   </p:cSld>
@@ -3726,47 +3727,32 @@
                 <a:latin typeface="微軟正黑體" pitchFamily="34" charset="-120"/>
                 <a:ea typeface="微軟正黑體" pitchFamily="34" charset="-120"/>
               </a:rPr>
-              <a:t>有尊榮和威嚴在他面前；有能力與華美在他聖所。</a:t>
-            </a:r>
-            <a:r>
-              <a:rPr lang="en-US" altLang="zh-TW" sz="6400" dirty="0">
+              <a:t>有尊榮和威嚴在他面前；有能力與華美在他聖所</a:t>
+            </a:r>
+            <a:r>
+              <a:rPr lang="zh-TW" altLang="en-US" sz="6400" dirty="0">
                 <a:solidFill>
                   <a:srgbClr val="660033"/>
                 </a:solidFill>
                 <a:latin typeface="微軟正黑體" pitchFamily="34" charset="-120"/>
                 <a:ea typeface="微軟正黑體" pitchFamily="34" charset="-120"/>
               </a:rPr>
-              <a:t> </a:t>
-            </a:r>
-          </a:p>
-          <a:p>
-            <a:r>
-              <a:rPr lang="zh-TW" altLang="en-US" sz="6400" b="1" dirty="0">
-                <a:solidFill>
-                  <a:srgbClr val="660033"/>
-                </a:solidFill>
-                <a:latin typeface="微軟正黑體" pitchFamily="34" charset="-120"/>
-                <a:ea typeface="微軟正黑體" pitchFamily="34" charset="-120"/>
-              </a:rPr>
-              <a:t>要將耶和華的名所當得的榮耀歸給他，拿供物來進入他的院宇。</a:t>
-            </a:r>
-            <a:r>
-              <a:rPr lang="en-US" altLang="zh-TW" sz="6400" b="1" dirty="0">
-                <a:solidFill>
-                  <a:srgbClr val="660033"/>
-                </a:solidFill>
-                <a:latin typeface="微軟正黑體" pitchFamily="34" charset="-120"/>
-                <a:ea typeface="微軟正黑體" pitchFamily="34" charset="-120"/>
-              </a:rPr>
-              <a:t> </a:t>
-            </a:r>
+              <a:t>。</a:t>
+            </a:r>
+            <a:endParaRPr lang="en-US" altLang="zh-TW" sz="6400" b="1" dirty="0">
+              <a:solidFill>
+                <a:srgbClr val="660033"/>
+              </a:solidFill>
+              <a:latin typeface="微軟正黑體" pitchFamily="34" charset="-120"/>
+              <a:ea typeface="微軟正黑體" pitchFamily="34" charset="-120"/>
+            </a:endParaRPr>
           </a:p>
         </p:txBody>
       </p:sp>
     </p:spTree>
     <p:extLst>
       <p:ext uri="{BB962C8B-B14F-4D97-AF65-F5344CB8AC3E}">
-        <p14:creationId xmlns:p14="http://schemas.microsoft.com/office/powerpoint/2010/main" val="1750650581"/>
+        <p14:creationId xmlns:p14="http://schemas.microsoft.com/office/powerpoint/2010/main" val="4289350165"/>
       </p:ext>
     </p:extLst>
   </p:cSld>
@@ -3806,7 +3792,7 @@
         <p:spPr>
           <a:xfrm>
             <a:off x="0" y="0"/>
-            <a:ext cx="11887200" cy="6858000"/>
+            <a:ext cx="12039600" cy="6858000"/>
           </a:xfrm>
         </p:spPr>
         <p:txBody>
@@ -3814,6 +3800,45 @@
             <a:noAutofit/>
           </a:bodyPr>
           <a:lstStyle/>
+          <a:p>
+            <a:r>
+              <a:rPr lang="zh-TW" altLang="en-US" sz="6400" b="1" dirty="0">
+                <a:solidFill>
+                  <a:srgbClr val="660033"/>
+                </a:solidFill>
+                <a:latin typeface="微軟正黑體" pitchFamily="34" charset="-120"/>
+                <a:ea typeface="微軟正黑體" pitchFamily="34" charset="-120"/>
+              </a:rPr>
+              <a:t>要</a:t>
+            </a:r>
+            <a:r>
+              <a:rPr lang="zh-TW" altLang="en-US" sz="6400" b="1" dirty="0">
+                <a:solidFill>
+                  <a:srgbClr val="660033"/>
+                </a:solidFill>
+                <a:latin typeface="微軟正黑體" pitchFamily="34" charset="-120"/>
+                <a:ea typeface="微軟正黑體" pitchFamily="34" charset="-120"/>
+              </a:rPr>
+              <a:t>將耶和華的名所當得的榮耀歸給他，拿供物來進入他的院宇。</a:t>
+            </a:r>
+            <a:r>
+              <a:rPr lang="en-US" altLang="zh-TW" sz="6400" b="1" dirty="0">
+                <a:solidFill>
+                  <a:srgbClr val="660033"/>
+                </a:solidFill>
+                <a:latin typeface="微軟正黑體" pitchFamily="34" charset="-120"/>
+                <a:ea typeface="微軟正黑體" pitchFamily="34" charset="-120"/>
+              </a:rPr>
+              <a:t> </a:t>
+            </a:r>
+            <a:endParaRPr lang="en-US" altLang="zh-TW" sz="6400" b="1" dirty="0">
+              <a:solidFill>
+                <a:srgbClr val="660033"/>
+              </a:solidFill>
+              <a:latin typeface="微軟正黑體" pitchFamily="34" charset="-120"/>
+              <a:ea typeface="微軟正黑體" pitchFamily="34" charset="-120"/>
+            </a:endParaRPr>
+          </a:p>
           <a:p>
             <a:r>
               <a:rPr lang="zh-TW" altLang="en-US" sz="6400" dirty="0">
@@ -3833,34 +3858,12 @@
               <a:ea typeface="微軟正黑體" pitchFamily="34" charset="-120"/>
             </a:endParaRPr>
           </a:p>
-          <a:p>
-            <a:r>
-              <a:rPr lang="zh-TW" altLang="en-US" sz="6400" b="1" dirty="0">
-                <a:solidFill>
-                  <a:srgbClr val="660033"/>
-                </a:solidFill>
-                <a:latin typeface="微軟正黑體" pitchFamily="34" charset="-120"/>
-                <a:ea typeface="微軟正黑體" pitchFamily="34" charset="-120"/>
-              </a:rPr>
-              <a:t>民中的萬族啊，你們要將榮耀、能力歸給耶和華，都歸給耶和華！</a:t>
-            </a:r>
-            <a:r>
-              <a:rPr lang="en-US" altLang="zh-TW" sz="6400" b="1" dirty="0">
-                <a:solidFill>
-                  <a:srgbClr val="660033"/>
-                </a:solidFill>
-                <a:latin typeface="微軟正黑體" pitchFamily="34" charset="-120"/>
-                <a:ea typeface="微軟正黑體" pitchFamily="34" charset="-120"/>
-              </a:rPr>
-              <a:t> </a:t>
-            </a:r>
-          </a:p>
         </p:txBody>
       </p:sp>
     </p:spTree>
     <p:extLst>
       <p:ext uri="{BB962C8B-B14F-4D97-AF65-F5344CB8AC3E}">
-        <p14:creationId xmlns:p14="http://schemas.microsoft.com/office/powerpoint/2010/main" val="2287224099"/>
+        <p14:creationId xmlns:p14="http://schemas.microsoft.com/office/powerpoint/2010/main" val="609917763"/>
       </p:ext>
     </p:extLst>
   </p:cSld>
@@ -3910,6 +3913,91 @@
           <a:lstStyle/>
           <a:p>
             <a:r>
+              <a:rPr lang="zh-TW" altLang="en-US" sz="6400" b="1" dirty="0">
+                <a:solidFill>
+                  <a:srgbClr val="660033"/>
+                </a:solidFill>
+                <a:latin typeface="微軟正黑體" pitchFamily="34" charset="-120"/>
+                <a:ea typeface="微軟正黑體" pitchFamily="34" charset="-120"/>
+              </a:rPr>
+              <a:t>民</a:t>
+            </a:r>
+            <a:r>
+              <a:rPr lang="zh-TW" altLang="en-US" sz="6400" b="1" dirty="0">
+                <a:solidFill>
+                  <a:srgbClr val="660033"/>
+                </a:solidFill>
+                <a:latin typeface="微軟正黑體" pitchFamily="34" charset="-120"/>
+                <a:ea typeface="微軟正黑體" pitchFamily="34" charset="-120"/>
+              </a:rPr>
+              <a:t>中的萬族啊，你們要將榮耀、能力歸給耶和華，都歸給耶和華！</a:t>
+            </a:r>
+            <a:r>
+              <a:rPr lang="en-US" altLang="zh-TW" sz="6400" b="1" dirty="0">
+                <a:solidFill>
+                  <a:srgbClr val="660033"/>
+                </a:solidFill>
+                <a:latin typeface="微軟正黑體" pitchFamily="34" charset="-120"/>
+                <a:ea typeface="微軟正黑體" pitchFamily="34" charset="-120"/>
+              </a:rPr>
+              <a:t> </a:t>
+            </a:r>
+          </a:p>
+        </p:txBody>
+      </p:sp>
+    </p:spTree>
+    <p:extLst>
+      <p:ext uri="{BB962C8B-B14F-4D97-AF65-F5344CB8AC3E}">
+        <p14:creationId xmlns:p14="http://schemas.microsoft.com/office/powerpoint/2010/main" val="1363721557"/>
+      </p:ext>
+    </p:extLst>
+  </p:cSld>
+  <p:clrMapOvr>
+    <a:masterClrMapping/>
+  </p:clrMapOvr>
+</p:sld>
+</file>
+
+<file path=ppt/slides/slide6.xml><?xml version="1.0" encoding="utf-8"?>
+<p:sld xmlns:a="http://schemas.openxmlformats.org/drawingml/2006/main" xmlns:r="http://schemas.openxmlformats.org/officeDocument/2006/relationships" xmlns:p="http://schemas.openxmlformats.org/presentationml/2006/main">
+  <p:cSld>
+    <p:spTree>
+      <p:nvGrpSpPr>
+        <p:cNvPr id="1" name=""/>
+        <p:cNvGrpSpPr/>
+        <p:nvPr/>
+      </p:nvGrpSpPr>
+      <p:grpSpPr>
+        <a:xfrm>
+          <a:off x="0" y="0"/>
+          <a:ext cx="0" cy="0"/>
+          <a:chOff x="0" y="0"/>
+          <a:chExt cx="0" cy="0"/>
+        </a:xfrm>
+      </p:grpSpPr>
+      <p:sp>
+        <p:nvSpPr>
+          <p:cNvPr id="3" name="內容版面配置區 2"/>
+          <p:cNvSpPr>
+            <a:spLocks noGrp="1"/>
+          </p:cNvSpPr>
+          <p:nvPr>
+            <p:ph idx="1"/>
+          </p:nvPr>
+        </p:nvSpPr>
+        <p:spPr>
+          <a:xfrm>
+            <a:off x="0" y="0"/>
+            <a:ext cx="11887200" cy="6858000"/>
+          </a:xfrm>
+        </p:spPr>
+        <p:txBody>
+          <a:bodyPr anchor="ctr">
+            <a:noAutofit/>
+          </a:bodyPr>
+          <a:lstStyle/>
+          <a:p>
+            <a:r>
               <a:rPr lang="zh-TW" altLang="en-US" sz="6400" dirty="0">
                 <a:solidFill>
                   <a:srgbClr val="660033"/>
@@ -3954,7 +4042,7 @@
     </p:spTree>
     <p:extLst>
       <p:ext uri="{BB962C8B-B14F-4D97-AF65-F5344CB8AC3E}">
-        <p14:creationId xmlns:p14="http://schemas.microsoft.com/office/powerpoint/2010/main" val="2005163648"/>
+        <p14:creationId xmlns:p14="http://schemas.microsoft.com/office/powerpoint/2010/main" val="2984920061"/>
       </p:ext>
     </p:extLst>
   </p:cSld>

</xml_diff>